<commit_message>
Refactored the 7 classes into one switch view class which returns all the views as functions instead
</commit_message>
<xml_diff>
--- a/src/tindertutor/Assets/Symbols [Autosaved].pptx
+++ b/src/tindertutor/Assets/Symbols [Autosaved].pptx
@@ -8,6 +8,9 @@
     <p:sldId id="256" r:id="rId2"/>
     <p:sldId id="257" r:id="rId3"/>
     <p:sldId id="258" r:id="rId4"/>
+    <p:sldId id="259" r:id="rId5"/>
+    <p:sldId id="260" r:id="rId6"/>
+    <p:sldId id="261" r:id="rId7"/>
   </p:sldIdLst>
   <p:sldSz cx="12192000" cy="6858000"/>
   <p:notesSz cx="6858000" cy="9144000"/>
@@ -449,7 +452,7 @@
           <a:p>
             <a:fld id="{D1F01D47-7FC8-6D49-8D8A-7920D5FD7CAD}" type="datetimeFigureOut">
               <a:rPr lang="en-US" smtClean="0"/>
-              <a:t>2/28/19</a:t>
+              <a:t>3/14/19</a:t>
             </a:fld>
             <a:endParaRPr lang="en-US"/>
           </a:p>
@@ -647,7 +650,7 @@
           <a:p>
             <a:fld id="{D1F01D47-7FC8-6D49-8D8A-7920D5FD7CAD}" type="datetimeFigureOut">
               <a:rPr lang="en-US" smtClean="0"/>
-              <a:t>2/28/19</a:t>
+              <a:t>3/14/19</a:t>
             </a:fld>
             <a:endParaRPr lang="en-US"/>
           </a:p>
@@ -855,7 +858,7 @@
           <a:p>
             <a:fld id="{D1F01D47-7FC8-6D49-8D8A-7920D5FD7CAD}" type="datetimeFigureOut">
               <a:rPr lang="en-US" smtClean="0"/>
-              <a:t>2/28/19</a:t>
+              <a:t>3/14/19</a:t>
             </a:fld>
             <a:endParaRPr lang="en-US"/>
           </a:p>
@@ -1053,7 +1056,7 @@
           <a:p>
             <a:fld id="{D1F01D47-7FC8-6D49-8D8A-7920D5FD7CAD}" type="datetimeFigureOut">
               <a:rPr lang="en-US" smtClean="0"/>
-              <a:t>2/28/19</a:t>
+              <a:t>3/14/19</a:t>
             </a:fld>
             <a:endParaRPr lang="en-US"/>
           </a:p>
@@ -1328,7 +1331,7 @@
           <a:p>
             <a:fld id="{D1F01D47-7FC8-6D49-8D8A-7920D5FD7CAD}" type="datetimeFigureOut">
               <a:rPr lang="en-US" smtClean="0"/>
-              <a:t>2/28/19</a:t>
+              <a:t>3/14/19</a:t>
             </a:fld>
             <a:endParaRPr lang="en-US"/>
           </a:p>
@@ -1593,7 +1596,7 @@
           <a:p>
             <a:fld id="{D1F01D47-7FC8-6D49-8D8A-7920D5FD7CAD}" type="datetimeFigureOut">
               <a:rPr lang="en-US" smtClean="0"/>
-              <a:t>2/28/19</a:t>
+              <a:t>3/14/19</a:t>
             </a:fld>
             <a:endParaRPr lang="en-US"/>
           </a:p>
@@ -2005,7 +2008,7 @@
           <a:p>
             <a:fld id="{D1F01D47-7FC8-6D49-8D8A-7920D5FD7CAD}" type="datetimeFigureOut">
               <a:rPr lang="en-US" smtClean="0"/>
-              <a:t>2/28/19</a:t>
+              <a:t>3/14/19</a:t>
             </a:fld>
             <a:endParaRPr lang="en-US"/>
           </a:p>
@@ -2146,7 +2149,7 @@
           <a:p>
             <a:fld id="{D1F01D47-7FC8-6D49-8D8A-7920D5FD7CAD}" type="datetimeFigureOut">
               <a:rPr lang="en-US" smtClean="0"/>
-              <a:t>2/28/19</a:t>
+              <a:t>3/14/19</a:t>
             </a:fld>
             <a:endParaRPr lang="en-US"/>
           </a:p>
@@ -2259,7 +2262,7 @@
           <a:p>
             <a:fld id="{D1F01D47-7FC8-6D49-8D8A-7920D5FD7CAD}" type="datetimeFigureOut">
               <a:rPr lang="en-US" smtClean="0"/>
-              <a:t>2/28/19</a:t>
+              <a:t>3/14/19</a:t>
             </a:fld>
             <a:endParaRPr lang="en-US"/>
           </a:p>
@@ -2570,7 +2573,7 @@
           <a:p>
             <a:fld id="{D1F01D47-7FC8-6D49-8D8A-7920D5FD7CAD}" type="datetimeFigureOut">
               <a:rPr lang="en-US" smtClean="0"/>
-              <a:t>2/28/19</a:t>
+              <a:t>3/14/19</a:t>
             </a:fld>
             <a:endParaRPr lang="en-US"/>
           </a:p>
@@ -2858,7 +2861,7 @@
           <a:p>
             <a:fld id="{D1F01D47-7FC8-6D49-8D8A-7920D5FD7CAD}" type="datetimeFigureOut">
               <a:rPr lang="en-US" smtClean="0"/>
-              <a:t>2/28/19</a:t>
+              <a:t>3/14/19</a:t>
             </a:fld>
             <a:endParaRPr lang="en-US"/>
           </a:p>
@@ -3099,7 +3102,7 @@
           <a:p>
             <a:fld id="{D1F01D47-7FC8-6D49-8D8A-7920D5FD7CAD}" type="datetimeFigureOut">
               <a:rPr lang="en-US" smtClean="0"/>
-              <a:t>2/28/19</a:t>
+              <a:t>3/14/19</a:t>
             </a:fld>
             <a:endParaRPr lang="en-US"/>
           </a:p>
@@ -3530,7 +3533,7 @@
         </p:nvSpPr>
         <p:spPr>
           <a:xfrm>
-            <a:off x="3319463" y="1213008"/>
+            <a:off x="2316831" y="1646145"/>
             <a:ext cx="5443537" cy="4431983"/>
           </a:xfrm>
           <a:prstGeom prst="rect">
@@ -3603,7 +3606,7 @@
         </p:blipFill>
         <p:spPr>
           <a:xfrm>
-            <a:off x="7848600" y="1524000"/>
+            <a:off x="8960769" y="1319463"/>
             <a:ext cx="914400" cy="914400"/>
           </a:xfrm>
           <a:prstGeom prst="rect">
@@ -5338,6 +5341,595 @@
 </p:sld>
 </file>
 
+<file path=ppt/slides/slide4.xml><?xml version="1.0" encoding="utf-8"?>
+<p:sld xmlns:a="http://schemas.openxmlformats.org/drawingml/2006/main" xmlns:r="http://schemas.openxmlformats.org/officeDocument/2006/relationships" xmlns:p="http://schemas.openxmlformats.org/presentationml/2006/main">
+  <p:cSld>
+    <p:spTree>
+      <p:nvGrpSpPr>
+        <p:cNvPr id="1" name=""/>
+        <p:cNvGrpSpPr/>
+        <p:nvPr/>
+      </p:nvGrpSpPr>
+      <p:grpSpPr>
+        <a:xfrm>
+          <a:off x="0" y="0"/>
+          <a:ext cx="0" cy="0"/>
+          <a:chOff x="0" y="0"/>
+          <a:chExt cx="0" cy="0"/>
+        </a:xfrm>
+      </p:grpSpPr>
+      <p:sp>
+        <p:nvSpPr>
+          <p:cNvPr id="4" name="Rectangle 3">
+            <a:extLst>
+              <a:ext uri="{FF2B5EF4-FFF2-40B4-BE49-F238E27FC236}">
+                <a16:creationId xmlns:a16="http://schemas.microsoft.com/office/drawing/2014/main" id="{FF86C807-A324-CF4D-96D1-5D600A788211}"/>
+              </a:ext>
+            </a:extLst>
+          </p:cNvPr>
+          <p:cNvSpPr/>
+          <p:nvPr/>
+        </p:nvSpPr>
+        <p:spPr>
+          <a:xfrm>
+            <a:off x="2538663" y="2334125"/>
+            <a:ext cx="5594685" cy="81965"/>
+          </a:xfrm>
+          <a:prstGeom prst="rect">
+            <a:avLst/>
+          </a:prstGeom>
+          <a:solidFill>
+            <a:srgbClr val="F44336"/>
+          </a:solidFill>
+          <a:ln>
+            <a:solidFill>
+              <a:srgbClr val="F44336"/>
+            </a:solidFill>
+          </a:ln>
+        </p:spPr>
+        <p:style>
+          <a:lnRef idx="2">
+            <a:schemeClr val="accent1">
+              <a:shade val="50000"/>
+            </a:schemeClr>
+          </a:lnRef>
+          <a:fillRef idx="1">
+            <a:schemeClr val="accent1"/>
+          </a:fillRef>
+          <a:effectRef idx="0">
+            <a:schemeClr val="accent1"/>
+          </a:effectRef>
+          <a:fontRef idx="minor">
+            <a:schemeClr val="lt1"/>
+          </a:fontRef>
+        </p:style>
+        <p:txBody>
+          <a:bodyPr rtlCol="0" anchor="ctr"/>
+          <a:lstStyle/>
+          <a:p>
+            <a:pPr algn="ctr"/>
+            <a:endParaRPr lang="en-US"/>
+          </a:p>
+        </p:txBody>
+      </p:sp>
+      <p:sp>
+        <p:nvSpPr>
+          <p:cNvPr id="5" name="Rectangle 4">
+            <a:extLst>
+              <a:ext uri="{FF2B5EF4-FFF2-40B4-BE49-F238E27FC236}">
+                <a16:creationId xmlns:a16="http://schemas.microsoft.com/office/drawing/2014/main" id="{65780D8C-4DB2-684C-8622-FD0E496D7328}"/>
+              </a:ext>
+            </a:extLst>
+          </p:cNvPr>
+          <p:cNvSpPr/>
+          <p:nvPr/>
+        </p:nvSpPr>
+        <p:spPr>
+          <a:xfrm>
+            <a:off x="2622884" y="2440155"/>
+            <a:ext cx="5414211" cy="1977690"/>
+          </a:xfrm>
+          <a:prstGeom prst="rect">
+            <a:avLst/>
+          </a:prstGeom>
+          <a:solidFill>
+            <a:schemeClr val="bg1"/>
+          </a:solidFill>
+          <a:ln>
+            <a:solidFill>
+              <a:srgbClr val="F44336"/>
+            </a:solidFill>
+          </a:ln>
+        </p:spPr>
+        <p:style>
+          <a:lnRef idx="2">
+            <a:schemeClr val="accent1">
+              <a:shade val="50000"/>
+            </a:schemeClr>
+          </a:lnRef>
+          <a:fillRef idx="1">
+            <a:schemeClr val="accent1"/>
+          </a:fillRef>
+          <a:effectRef idx="0">
+            <a:schemeClr val="accent1"/>
+          </a:effectRef>
+          <a:fontRef idx="minor">
+            <a:schemeClr val="lt1"/>
+          </a:fontRef>
+        </p:style>
+        <p:txBody>
+          <a:bodyPr rtlCol="0" anchor="ctr"/>
+          <a:lstStyle/>
+          <a:p>
+            <a:pPr algn="ctr"/>
+            <a:endParaRPr lang="en-US"/>
+          </a:p>
+        </p:txBody>
+      </p:sp>
+      <p:sp>
+        <p:nvSpPr>
+          <p:cNvPr id="7" name="TextBox 6">
+            <a:extLst>
+              <a:ext uri="{FF2B5EF4-FFF2-40B4-BE49-F238E27FC236}">
+                <a16:creationId xmlns:a16="http://schemas.microsoft.com/office/drawing/2014/main" id="{2FE453A9-2412-CB4E-A483-EDBC9BBEEAEA}"/>
+              </a:ext>
+            </a:extLst>
+          </p:cNvPr>
+          <p:cNvSpPr txBox="1"/>
+          <p:nvPr/>
+        </p:nvSpPr>
+        <p:spPr>
+          <a:xfrm>
+            <a:off x="2737183" y="3105834"/>
+            <a:ext cx="5185611" cy="646331"/>
+          </a:xfrm>
+          <a:prstGeom prst="rect">
+            <a:avLst/>
+          </a:prstGeom>
+          <a:noFill/>
+        </p:spPr>
+        <p:txBody>
+          <a:bodyPr wrap="square" rtlCol="0" anchor="ctr">
+            <a:spAutoFit/>
+          </a:bodyPr>
+          <a:lstStyle/>
+          <a:p>
+            <a:pPr algn="ctr"/>
+            <a:r>
+              <a:rPr lang="en-US" sz="3600" dirty="0">
+                <a:latin typeface="Chalkduster" panose="03050602040202020205" pitchFamily="66" charset="77"/>
+              </a:rPr>
+              <a:t>You’ve a Grind!!!</a:t>
+            </a:r>
+          </a:p>
+        </p:txBody>
+      </p:sp>
+    </p:spTree>
+    <p:extLst>
+      <p:ext uri="{BB962C8B-B14F-4D97-AF65-F5344CB8AC3E}">
+        <p14:creationId xmlns:p14="http://schemas.microsoft.com/office/powerpoint/2010/main" val="2323919597"/>
+      </p:ext>
+    </p:extLst>
+  </p:cSld>
+  <p:clrMapOvr>
+    <a:masterClrMapping/>
+  </p:clrMapOvr>
+</p:sld>
+</file>
+
+<file path=ppt/slides/slide5.xml><?xml version="1.0" encoding="utf-8"?>
+<p:sld xmlns:a="http://schemas.openxmlformats.org/drawingml/2006/main" xmlns:r="http://schemas.openxmlformats.org/officeDocument/2006/relationships" xmlns:p="http://schemas.openxmlformats.org/presentationml/2006/main">
+  <p:cSld>
+    <p:spTree>
+      <p:nvGrpSpPr>
+        <p:cNvPr id="1" name=""/>
+        <p:cNvGrpSpPr/>
+        <p:nvPr/>
+      </p:nvGrpSpPr>
+      <p:grpSpPr>
+        <a:xfrm>
+          <a:off x="0" y="0"/>
+          <a:ext cx="0" cy="0"/>
+          <a:chOff x="0" y="0"/>
+          <a:chExt cx="0" cy="0"/>
+        </a:xfrm>
+      </p:grpSpPr>
+      <p:sp>
+        <p:nvSpPr>
+          <p:cNvPr id="6" name="Rectangle 5">
+            <a:extLst>
+              <a:ext uri="{FF2B5EF4-FFF2-40B4-BE49-F238E27FC236}">
+                <a16:creationId xmlns:a16="http://schemas.microsoft.com/office/drawing/2014/main" id="{28880C00-77EC-7D4A-A9C9-21B69150F63E}"/>
+              </a:ext>
+            </a:extLst>
+          </p:cNvPr>
+          <p:cNvSpPr/>
+          <p:nvPr/>
+        </p:nvSpPr>
+        <p:spPr>
+          <a:xfrm>
+            <a:off x="3086852" y="1213008"/>
+            <a:ext cx="5443537" cy="4431983"/>
+          </a:xfrm>
+          <a:prstGeom prst="rect">
+            <a:avLst/>
+          </a:prstGeom>
+          <a:noFill/>
+        </p:spPr>
+        <p:txBody>
+          <a:bodyPr wrap="square" lIns="0" tIns="0" rIns="0" bIns="0">
+            <a:spAutoFit/>
+            <a:scene3d>
+              <a:camera prst="orthographicFront"/>
+              <a:lightRig rig="threePt" dir="t"/>
+            </a:scene3d>
+            <a:sp3d extrusionH="1562100">
+              <a:bevelB w="82550" h="38100" prst="coolSlant"/>
+              <a:extrusionClr>
+                <a:schemeClr val="tx1"/>
+              </a:extrusionClr>
+            </a:sp3d>
+          </a:bodyPr>
+          <a:lstStyle/>
+          <a:p>
+            <a:pPr algn="ctr" defTabSz="57150"/>
+            <a:r>
+              <a:rPr lang="en-US" sz="28800" b="1" spc="-500" dirty="0">
+                <a:ln w="79375">
+                  <a:solidFill>
+                    <a:srgbClr val="F44336"/>
+                  </a:solidFill>
+                </a:ln>
+                <a:solidFill>
+                  <a:schemeClr val="bg1"/>
+                </a:solidFill>
+                <a:effectLst>
+                  <a:outerShdw blurRad="63500" dist="38100" algn="l" rotWithShape="0">
+                    <a:prstClr val="black"/>
+                  </a:outerShdw>
+                </a:effectLst>
+                <a:latin typeface="Aharoni" panose="02010803020104030203" pitchFamily="2" charset="-79"/>
+                <a:ea typeface="Hiragino Kaku Gothic Std W8" panose="020B0800000000000000" pitchFamily="34" charset="-128"/>
+                <a:cs typeface="Aharoni" panose="02010803020104030203" pitchFamily="2" charset="-79"/>
+              </a:rPr>
+              <a:t>T</a:t>
+            </a:r>
+            <a:r>
+              <a:rPr lang="en-US" sz="28800" b="1" spc="-500" dirty="0">
+                <a:ln w="79375">
+                  <a:solidFill>
+                    <a:schemeClr val="accent1"/>
+                  </a:solidFill>
+                </a:ln>
+                <a:solidFill>
+                  <a:schemeClr val="bg1"/>
+                </a:solidFill>
+                <a:effectLst>
+                  <a:outerShdw blurRad="63500" dist="38100" algn="l" rotWithShape="0">
+                    <a:prstClr val="black"/>
+                  </a:outerShdw>
+                </a:effectLst>
+                <a:latin typeface="Aharoni" panose="02010803020104030203" pitchFamily="2" charset="-79"/>
+                <a:ea typeface="Hiragino Kaku Gothic Std W8" panose="020B0800000000000000" pitchFamily="34" charset="-128"/>
+                <a:cs typeface="Aharoni" panose="02010803020104030203" pitchFamily="2" charset="-79"/>
+              </a:rPr>
+              <a:t>T</a:t>
+            </a:r>
+          </a:p>
+        </p:txBody>
+      </p:sp>
+      <p:sp>
+        <p:nvSpPr>
+          <p:cNvPr id="8" name="Rectangle 7">
+            <a:extLst>
+              <a:ext uri="{FF2B5EF4-FFF2-40B4-BE49-F238E27FC236}">
+                <a16:creationId xmlns:a16="http://schemas.microsoft.com/office/drawing/2014/main" id="{4C8E6929-D333-5E47-B029-72372A753249}"/>
+              </a:ext>
+            </a:extLst>
+          </p:cNvPr>
+          <p:cNvSpPr/>
+          <p:nvPr/>
+        </p:nvSpPr>
+        <p:spPr>
+          <a:xfrm>
+            <a:off x="5623560" y="2103120"/>
+            <a:ext cx="320040" cy="396240"/>
+          </a:xfrm>
+          <a:prstGeom prst="rect">
+            <a:avLst/>
+          </a:prstGeom>
+          <a:solidFill>
+            <a:schemeClr val="bg1"/>
+          </a:solidFill>
+          <a:ln>
+            <a:noFill/>
+          </a:ln>
+        </p:spPr>
+        <p:style>
+          <a:lnRef idx="2">
+            <a:schemeClr val="accent1">
+              <a:shade val="50000"/>
+            </a:schemeClr>
+          </a:lnRef>
+          <a:fillRef idx="1">
+            <a:schemeClr val="accent1"/>
+          </a:fillRef>
+          <a:effectRef idx="0">
+            <a:schemeClr val="accent1"/>
+          </a:effectRef>
+          <a:fontRef idx="minor">
+            <a:schemeClr val="lt1"/>
+          </a:fontRef>
+        </p:style>
+        <p:txBody>
+          <a:bodyPr rtlCol="0" anchor="ctr"/>
+          <a:lstStyle/>
+          <a:p>
+            <a:pPr algn="ctr"/>
+            <a:endParaRPr lang="en-US"/>
+          </a:p>
+        </p:txBody>
+      </p:sp>
+    </p:spTree>
+    <p:extLst>
+      <p:ext uri="{BB962C8B-B14F-4D97-AF65-F5344CB8AC3E}">
+        <p14:creationId xmlns:p14="http://schemas.microsoft.com/office/powerpoint/2010/main" val="4244533474"/>
+      </p:ext>
+    </p:extLst>
+  </p:cSld>
+  <p:clrMapOvr>
+    <a:masterClrMapping/>
+  </p:clrMapOvr>
+</p:sld>
+</file>
+
+<file path=ppt/slides/slide6.xml><?xml version="1.0" encoding="utf-8"?>
+<p:sld xmlns:a="http://schemas.openxmlformats.org/drawingml/2006/main" xmlns:r="http://schemas.openxmlformats.org/officeDocument/2006/relationships" xmlns:p="http://schemas.openxmlformats.org/presentationml/2006/main">
+  <p:cSld>
+    <p:spTree>
+      <p:nvGrpSpPr>
+        <p:cNvPr id="1" name=""/>
+        <p:cNvGrpSpPr/>
+        <p:nvPr/>
+      </p:nvGrpSpPr>
+      <p:grpSpPr>
+        <a:xfrm>
+          <a:off x="0" y="0"/>
+          <a:ext cx="0" cy="0"/>
+          <a:chOff x="0" y="0"/>
+          <a:chExt cx="0" cy="0"/>
+        </a:xfrm>
+      </p:grpSpPr>
+      <p:sp>
+        <p:nvSpPr>
+          <p:cNvPr id="4" name="Oval 3">
+            <a:extLst>
+              <a:ext uri="{FF2B5EF4-FFF2-40B4-BE49-F238E27FC236}">
+                <a16:creationId xmlns:a16="http://schemas.microsoft.com/office/drawing/2014/main" id="{14339AF9-CF56-1340-B990-DD686ABE652A}"/>
+              </a:ext>
+            </a:extLst>
+          </p:cNvPr>
+          <p:cNvSpPr/>
+          <p:nvPr/>
+        </p:nvSpPr>
+        <p:spPr>
+          <a:xfrm>
+            <a:off x="3489960" y="2743200"/>
+            <a:ext cx="1249680" cy="1203960"/>
+          </a:xfrm>
+          <a:prstGeom prst="ellipse">
+            <a:avLst/>
+          </a:prstGeom>
+          <a:noFill/>
+          <a:ln w="31750">
+            <a:solidFill>
+              <a:srgbClr val="F44336"/>
+            </a:solidFill>
+          </a:ln>
+        </p:spPr>
+        <p:style>
+          <a:lnRef idx="2">
+            <a:schemeClr val="accent1">
+              <a:shade val="50000"/>
+            </a:schemeClr>
+          </a:lnRef>
+          <a:fillRef idx="1">
+            <a:schemeClr val="accent1"/>
+          </a:fillRef>
+          <a:effectRef idx="0">
+            <a:schemeClr val="accent1"/>
+          </a:effectRef>
+          <a:fontRef idx="minor">
+            <a:schemeClr val="lt1"/>
+          </a:fontRef>
+        </p:style>
+        <p:txBody>
+          <a:bodyPr rtlCol="0" anchor="ctr"/>
+          <a:lstStyle/>
+          <a:p>
+            <a:pPr algn="ctr"/>
+            <a:endParaRPr lang="en-US"/>
+          </a:p>
+        </p:txBody>
+      </p:sp>
+      <p:sp>
+        <p:nvSpPr>
+          <p:cNvPr id="5" name="Oval 4">
+            <a:extLst>
+              <a:ext uri="{FF2B5EF4-FFF2-40B4-BE49-F238E27FC236}">
+                <a16:creationId xmlns:a16="http://schemas.microsoft.com/office/drawing/2014/main" id="{52073FB9-9083-3849-8017-E6BF5EB8A262}"/>
+              </a:ext>
+            </a:extLst>
+          </p:cNvPr>
+          <p:cNvSpPr/>
+          <p:nvPr/>
+        </p:nvSpPr>
+        <p:spPr>
+          <a:xfrm>
+            <a:off x="5471160" y="2743200"/>
+            <a:ext cx="1249680" cy="1203960"/>
+          </a:xfrm>
+          <a:prstGeom prst="ellipse">
+            <a:avLst/>
+          </a:prstGeom>
+          <a:noFill/>
+          <a:ln w="31750">
+            <a:solidFill>
+              <a:srgbClr val="92D050"/>
+            </a:solidFill>
+          </a:ln>
+        </p:spPr>
+        <p:style>
+          <a:lnRef idx="2">
+            <a:schemeClr val="accent1">
+              <a:shade val="50000"/>
+            </a:schemeClr>
+          </a:lnRef>
+          <a:fillRef idx="1">
+            <a:schemeClr val="accent1"/>
+          </a:fillRef>
+          <a:effectRef idx="0">
+            <a:schemeClr val="accent1"/>
+          </a:effectRef>
+          <a:fontRef idx="minor">
+            <a:schemeClr val="lt1"/>
+          </a:fontRef>
+        </p:style>
+        <p:txBody>
+          <a:bodyPr rtlCol="0" anchor="ctr"/>
+          <a:lstStyle/>
+          <a:p>
+            <a:pPr algn="ctr"/>
+            <a:endParaRPr lang="en-US"/>
+          </a:p>
+        </p:txBody>
+      </p:sp>
+      <p:pic>
+        <p:nvPicPr>
+          <p:cNvPr id="7" name="Graphic 6" descr="Checkmark">
+            <a:extLst>
+              <a:ext uri="{FF2B5EF4-FFF2-40B4-BE49-F238E27FC236}">
+                <a16:creationId xmlns:a16="http://schemas.microsoft.com/office/drawing/2014/main" id="{55E93C35-E2E8-4348-ABEB-0AB1A327FF58}"/>
+              </a:ext>
+            </a:extLst>
+          </p:cNvPr>
+          <p:cNvPicPr>
+            <a:picLocks noChangeAspect="1"/>
+          </p:cNvPicPr>
+          <p:nvPr/>
+        </p:nvPicPr>
+        <p:blipFill>
+          <a:blip r:embed="rId2">
+            <a:extLst>
+              <a:ext uri="{96DAC541-7B7A-43D3-8B79-37D633B846F1}">
+                <asvg:svgBlip xmlns:asvg="http://schemas.microsoft.com/office/drawing/2016/SVG/main" r:embed="rId3"/>
+              </a:ext>
+            </a:extLst>
+          </a:blip>
+          <a:stretch>
+            <a:fillRect/>
+          </a:stretch>
+        </p:blipFill>
+        <p:spPr>
+          <a:xfrm>
+            <a:off x="5638800" y="2887980"/>
+            <a:ext cx="914400" cy="914400"/>
+          </a:xfrm>
+          <a:prstGeom prst="rect">
+            <a:avLst/>
+          </a:prstGeom>
+        </p:spPr>
+      </p:pic>
+      <p:pic>
+        <p:nvPicPr>
+          <p:cNvPr id="9" name="Graphic 8" descr="Close">
+            <a:extLst>
+              <a:ext uri="{FF2B5EF4-FFF2-40B4-BE49-F238E27FC236}">
+                <a16:creationId xmlns:a16="http://schemas.microsoft.com/office/drawing/2014/main" id="{E3ECD9C0-0939-8346-B348-61F78EF98C3C}"/>
+              </a:ext>
+            </a:extLst>
+          </p:cNvPr>
+          <p:cNvPicPr>
+            <a:picLocks noChangeAspect="1"/>
+          </p:cNvPicPr>
+          <p:nvPr/>
+        </p:nvPicPr>
+        <p:blipFill>
+          <a:blip r:embed="rId4">
+            <a:extLst>
+              <a:ext uri="{96DAC541-7B7A-43D3-8B79-37D633B846F1}">
+                <asvg:svgBlip xmlns:asvg="http://schemas.microsoft.com/office/drawing/2016/SVG/main" r:embed="rId5"/>
+              </a:ext>
+            </a:extLst>
+          </a:blip>
+          <a:stretch>
+            <a:fillRect/>
+          </a:stretch>
+        </p:blipFill>
+        <p:spPr>
+          <a:xfrm>
+            <a:off x="3657600" y="2907030"/>
+            <a:ext cx="914400" cy="914400"/>
+          </a:xfrm>
+          <a:prstGeom prst="rect">
+            <a:avLst/>
+          </a:prstGeom>
+        </p:spPr>
+      </p:pic>
+      <p:cxnSp>
+        <p:nvCxnSpPr>
+          <p:cNvPr id="11" name="Straight Connector 10">
+            <a:extLst>
+              <a:ext uri="{FF2B5EF4-FFF2-40B4-BE49-F238E27FC236}">
+                <a16:creationId xmlns:a16="http://schemas.microsoft.com/office/drawing/2014/main" id="{1028F2BA-3D9A-4D46-8C2C-0AC307297179}"/>
+              </a:ext>
+            </a:extLst>
+          </p:cNvPr>
+          <p:cNvCxnSpPr/>
+          <p:nvPr/>
+        </p:nvCxnSpPr>
+        <p:spPr>
+          <a:xfrm>
+            <a:off x="2773680" y="4815840"/>
+            <a:ext cx="7543800" cy="0"/>
+          </a:xfrm>
+          <a:prstGeom prst="line">
+            <a:avLst/>
+          </a:prstGeom>
+          <a:ln>
+            <a:solidFill>
+              <a:srgbClr val="F44336"/>
+            </a:solidFill>
+          </a:ln>
+        </p:spPr>
+        <p:style>
+          <a:lnRef idx="1">
+            <a:schemeClr val="accent1"/>
+          </a:lnRef>
+          <a:fillRef idx="0">
+            <a:schemeClr val="accent1"/>
+          </a:fillRef>
+          <a:effectRef idx="0">
+            <a:schemeClr val="accent1"/>
+          </a:effectRef>
+          <a:fontRef idx="minor">
+            <a:schemeClr val="tx1"/>
+          </a:fontRef>
+        </p:style>
+      </p:cxnSp>
+    </p:spTree>
+    <p:extLst>
+      <p:ext uri="{BB962C8B-B14F-4D97-AF65-F5344CB8AC3E}">
+        <p14:creationId xmlns:p14="http://schemas.microsoft.com/office/powerpoint/2010/main" val="3062591639"/>
+      </p:ext>
+    </p:extLst>
+  </p:cSld>
+  <p:clrMapOvr>
+    <a:masterClrMapping/>
+  </p:clrMapOvr>
+</p:sld>
+</file>
+
 <file path=ppt/theme/theme1.xml><?xml version="1.0" encoding="utf-8"?>
 <a:theme xmlns:a="http://schemas.openxmlformats.org/drawingml/2006/main" name="Office Theme">
   <a:themeElements>

</xml_diff>

<commit_message>
App got a makeover and now is almost functional , needs logout , match and message functionality but rest is done
</commit_message>
<xml_diff>
--- a/src/tindertutor/Assets/Symbols [Autosaved].pptx
+++ b/src/tindertutor/Assets/Symbols [Autosaved].pptx
@@ -452,7 +452,7 @@
           <a:p>
             <a:fld id="{D1F01D47-7FC8-6D49-8D8A-7920D5FD7CAD}" type="datetimeFigureOut">
               <a:rPr lang="en-US" smtClean="0"/>
-              <a:t>3/14/19</a:t>
+              <a:t>4/3/19</a:t>
             </a:fld>
             <a:endParaRPr lang="en-US"/>
           </a:p>
@@ -650,7 +650,7 @@
           <a:p>
             <a:fld id="{D1F01D47-7FC8-6D49-8D8A-7920D5FD7CAD}" type="datetimeFigureOut">
               <a:rPr lang="en-US" smtClean="0"/>
-              <a:t>3/14/19</a:t>
+              <a:t>4/3/19</a:t>
             </a:fld>
             <a:endParaRPr lang="en-US"/>
           </a:p>
@@ -858,7 +858,7 @@
           <a:p>
             <a:fld id="{D1F01D47-7FC8-6D49-8D8A-7920D5FD7CAD}" type="datetimeFigureOut">
               <a:rPr lang="en-US" smtClean="0"/>
-              <a:t>3/14/19</a:t>
+              <a:t>4/3/19</a:t>
             </a:fld>
             <a:endParaRPr lang="en-US"/>
           </a:p>
@@ -1056,7 +1056,7 @@
           <a:p>
             <a:fld id="{D1F01D47-7FC8-6D49-8D8A-7920D5FD7CAD}" type="datetimeFigureOut">
               <a:rPr lang="en-US" smtClean="0"/>
-              <a:t>3/14/19</a:t>
+              <a:t>4/3/19</a:t>
             </a:fld>
             <a:endParaRPr lang="en-US"/>
           </a:p>
@@ -1331,7 +1331,7 @@
           <a:p>
             <a:fld id="{D1F01D47-7FC8-6D49-8D8A-7920D5FD7CAD}" type="datetimeFigureOut">
               <a:rPr lang="en-US" smtClean="0"/>
-              <a:t>3/14/19</a:t>
+              <a:t>4/3/19</a:t>
             </a:fld>
             <a:endParaRPr lang="en-US"/>
           </a:p>
@@ -1596,7 +1596,7 @@
           <a:p>
             <a:fld id="{D1F01D47-7FC8-6D49-8D8A-7920D5FD7CAD}" type="datetimeFigureOut">
               <a:rPr lang="en-US" smtClean="0"/>
-              <a:t>3/14/19</a:t>
+              <a:t>4/3/19</a:t>
             </a:fld>
             <a:endParaRPr lang="en-US"/>
           </a:p>
@@ -2008,7 +2008,7 @@
           <a:p>
             <a:fld id="{D1F01D47-7FC8-6D49-8D8A-7920D5FD7CAD}" type="datetimeFigureOut">
               <a:rPr lang="en-US" smtClean="0"/>
-              <a:t>3/14/19</a:t>
+              <a:t>4/3/19</a:t>
             </a:fld>
             <a:endParaRPr lang="en-US"/>
           </a:p>
@@ -2149,7 +2149,7 @@
           <a:p>
             <a:fld id="{D1F01D47-7FC8-6D49-8D8A-7920D5FD7CAD}" type="datetimeFigureOut">
               <a:rPr lang="en-US" smtClean="0"/>
-              <a:t>3/14/19</a:t>
+              <a:t>4/3/19</a:t>
             </a:fld>
             <a:endParaRPr lang="en-US"/>
           </a:p>
@@ -2262,7 +2262,7 @@
           <a:p>
             <a:fld id="{D1F01D47-7FC8-6D49-8D8A-7920D5FD7CAD}" type="datetimeFigureOut">
               <a:rPr lang="en-US" smtClean="0"/>
-              <a:t>3/14/19</a:t>
+              <a:t>4/3/19</a:t>
             </a:fld>
             <a:endParaRPr lang="en-US"/>
           </a:p>
@@ -2573,7 +2573,7 @@
           <a:p>
             <a:fld id="{D1F01D47-7FC8-6D49-8D8A-7920D5FD7CAD}" type="datetimeFigureOut">
               <a:rPr lang="en-US" smtClean="0"/>
-              <a:t>3/14/19</a:t>
+              <a:t>4/3/19</a:t>
             </a:fld>
             <a:endParaRPr lang="en-US"/>
           </a:p>
@@ -2861,7 +2861,7 @@
           <a:p>
             <a:fld id="{D1F01D47-7FC8-6D49-8D8A-7920D5FD7CAD}" type="datetimeFigureOut">
               <a:rPr lang="en-US" smtClean="0"/>
-              <a:t>3/14/19</a:t>
+              <a:t>4/3/19</a:t>
             </a:fld>
             <a:endParaRPr lang="en-US"/>
           </a:p>
@@ -3102,7 +3102,7 @@
           <a:p>
             <a:fld id="{D1F01D47-7FC8-6D49-8D8A-7920D5FD7CAD}" type="datetimeFigureOut">
               <a:rPr lang="en-US" smtClean="0"/>
-              <a:t>3/14/19</a:t>
+              <a:t>4/3/19</a:t>
             </a:fld>
             <a:endParaRPr lang="en-US"/>
           </a:p>
@@ -5500,6 +5500,98 @@
                 <a:latin typeface="Chalkduster" panose="03050602040202020205" pitchFamily="66" charset="77"/>
               </a:rPr>
               <a:t>You’ve a Grind!!!</a:t>
+            </a:r>
+          </a:p>
+        </p:txBody>
+      </p:sp>
+      <p:sp>
+        <p:nvSpPr>
+          <p:cNvPr id="3" name="Left Arrow 2">
+            <a:extLst>
+              <a:ext uri="{FF2B5EF4-FFF2-40B4-BE49-F238E27FC236}">
+                <a16:creationId xmlns:a16="http://schemas.microsoft.com/office/drawing/2014/main" id="{47DF1CA9-4ADC-3B4C-B72E-EAB2432F97BD}"/>
+              </a:ext>
+            </a:extLst>
+          </p:cNvPr>
+          <p:cNvSpPr/>
+          <p:nvPr/>
+        </p:nvSpPr>
+        <p:spPr>
+          <a:xfrm>
+            <a:off x="7671460" y="522512"/>
+            <a:ext cx="593766" cy="415637"/>
+          </a:xfrm>
+          <a:prstGeom prst="leftArrow">
+            <a:avLst/>
+          </a:prstGeom>
+          <a:solidFill>
+            <a:srgbClr val="F44336"/>
+          </a:solidFill>
+          <a:ln>
+            <a:noFill/>
+          </a:ln>
+        </p:spPr>
+        <p:style>
+          <a:lnRef idx="2">
+            <a:schemeClr val="accent1">
+              <a:shade val="50000"/>
+            </a:schemeClr>
+          </a:lnRef>
+          <a:fillRef idx="1">
+            <a:schemeClr val="accent1"/>
+          </a:fillRef>
+          <a:effectRef idx="0">
+            <a:schemeClr val="accent1"/>
+          </a:effectRef>
+          <a:fontRef idx="minor">
+            <a:schemeClr val="lt1"/>
+          </a:fontRef>
+        </p:style>
+        <p:txBody>
+          <a:bodyPr rtlCol="0" anchor="ctr"/>
+          <a:lstStyle/>
+          <a:p>
+            <a:pPr algn="ctr"/>
+            <a:endParaRPr lang="en-US"/>
+          </a:p>
+        </p:txBody>
+      </p:sp>
+      <p:sp>
+        <p:nvSpPr>
+          <p:cNvPr id="6" name="TextBox 5">
+            <a:extLst>
+              <a:ext uri="{FF2B5EF4-FFF2-40B4-BE49-F238E27FC236}">
+                <a16:creationId xmlns:a16="http://schemas.microsoft.com/office/drawing/2014/main" id="{95D72BCF-ED97-1940-B112-F3C87EB8A128}"/>
+              </a:ext>
+            </a:extLst>
+          </p:cNvPr>
+          <p:cNvSpPr txBox="1"/>
+          <p:nvPr/>
+        </p:nvSpPr>
+        <p:spPr>
+          <a:xfrm>
+            <a:off x="7858966" y="242531"/>
+            <a:ext cx="775855" cy="369332"/>
+          </a:xfrm>
+          <a:prstGeom prst="rect">
+            <a:avLst/>
+          </a:prstGeom>
+          <a:noFill/>
+        </p:spPr>
+        <p:txBody>
+          <a:bodyPr wrap="square" rtlCol="0">
+            <a:spAutoFit/>
+          </a:bodyPr>
+          <a:lstStyle/>
+          <a:p>
+            <a:pPr algn="ctr"/>
+            <a:r>
+              <a:rPr lang="en-US" dirty="0">
+                <a:solidFill>
+                  <a:srgbClr val="FF0000"/>
+                </a:solidFill>
+              </a:rPr>
+              <a:t>Back</a:t>
             </a:r>
           </a:p>
         </p:txBody>

</xml_diff>